<commit_message>
Modif of the slides
</commit_message>
<xml_diff>
--- a/Livrables/LwIP pour TIVA-C.pptx
+++ b/Livrables/LwIP pour TIVA-C.pptx
@@ -221,7 +221,7 @@
           <a:p>
             <a:fld id="{4AC7219B-832A-437B-90F3-FD50716ECD38}" type="datetimeFigureOut">
               <a:rPr lang="en-US" smtClean="0"/>
-              <a:t>2/6/2018</a:t>
+              <a:t>2/12/2018</a:t>
             </a:fld>
             <a:endParaRPr lang="en-US"/>
           </a:p>
@@ -668,7 +668,7 @@
           <a:effectLst/>
           <a:extLst>
             <a:ext uri="{91240B29-F687-4f45-9708-019B960494DF}">
-              <a14:hiddenLine xmlns:a14="http://schemas.microsoft.com/office/drawing/2010/main" xmlns="" w="9525">
+              <a14:hiddenLine xmlns="" xmlns:a14="http://schemas.microsoft.com/office/drawing/2010/main" w="9525">
                 <a:solidFill>
                   <a:srgbClr val="000000"/>
                 </a:solidFill>
@@ -860,7 +860,7 @@
           <a:p>
             <a:fld id="{6D6E9F1C-AC72-4930-835D-388E0145DFFE}" type="datetime1">
               <a:rPr lang="en-US" smtClean="0"/>
-              <a:t>2/6/2018</a:t>
+              <a:t>2/12/2018</a:t>
             </a:fld>
             <a:endParaRPr lang="en-US" dirty="0"/>
           </a:p>
@@ -1174,7 +1174,7 @@
           <a:p>
             <a:fld id="{312B8C13-63C7-4B2C-9356-1708309F86E0}" type="datetime1">
               <a:rPr lang="en-US" smtClean="0"/>
-              <a:t>2/6/2018</a:t>
+              <a:t>2/12/2018</a:t>
             </a:fld>
             <a:endParaRPr lang="en-US" dirty="0"/>
           </a:p>
@@ -1658,7 +1658,7 @@
           <a:p>
             <a:fld id="{34B9551C-A3D4-4DC6-8D8D-DA616E868CCA}" type="datetime1">
               <a:rPr lang="en-US" smtClean="0"/>
-              <a:t>2/6/2018</a:t>
+              <a:t>2/12/2018</a:t>
             </a:fld>
             <a:endParaRPr lang="en-US" dirty="0"/>
           </a:p>
@@ -2023,7 +2023,7 @@
           <a:p>
             <a:fld id="{C4C3B71F-8FDD-43E1-9558-A10A663340FF}" type="datetime1">
               <a:rPr lang="en-US" smtClean="0"/>
-              <a:t>2/6/2018</a:t>
+              <a:t>2/12/2018</a:t>
             </a:fld>
             <a:endParaRPr lang="en-US" dirty="0"/>
           </a:p>
@@ -2174,7 +2174,7 @@
           <a:ln/>
           <a:extLst>
             <a:ext uri="{91240B29-F687-4f45-9708-019B960494DF}">
-              <a14:hiddenLine xmlns:a14="http://schemas.microsoft.com/office/drawing/2010/main" xmlns="" w="9525">
+              <a14:hiddenLine xmlns="" xmlns:a14="http://schemas.microsoft.com/office/drawing/2010/main" w="9525">
                 <a:solidFill>
                   <a:srgbClr val="000000"/>
                 </a:solidFill>
@@ -2292,7 +2292,7 @@
           <a:p>
             <a:fld id="{8335497F-0CC8-4B92-8894-3D88462F295E}" type="datetime1">
               <a:rPr lang="en-US" smtClean="0"/>
-              <a:t>2/6/2018</a:t>
+              <a:t>2/12/2018</a:t>
             </a:fld>
             <a:endParaRPr lang="en-US" dirty="0"/>
           </a:p>
@@ -2445,7 +2445,7 @@
           <a:ln/>
           <a:extLst>
             <a:ext uri="{91240B29-F687-4f45-9708-019B960494DF}">
-              <a14:hiddenLine xmlns:a14="http://schemas.microsoft.com/office/drawing/2010/main" xmlns="" w="9525">
+              <a14:hiddenLine xmlns="" xmlns:a14="http://schemas.microsoft.com/office/drawing/2010/main" w="9525">
                 <a:solidFill>
                   <a:srgbClr val="000000"/>
                 </a:solidFill>
@@ -2573,7 +2573,7 @@
           <a:p>
             <a:fld id="{255766FB-FBA3-41DE-BACA-628DA8F183F2}" type="datetime1">
               <a:rPr lang="en-US" smtClean="0"/>
-              <a:t>2/6/2018</a:t>
+              <a:t>2/12/2018</a:t>
             </a:fld>
             <a:endParaRPr lang="en-US" dirty="0"/>
           </a:p>
@@ -2724,7 +2724,7 @@
           <a:ln/>
           <a:extLst>
             <a:ext uri="{91240B29-F687-4f45-9708-019B960494DF}">
-              <a14:hiddenLine xmlns:a14="http://schemas.microsoft.com/office/drawing/2010/main" xmlns="" w="9525">
+              <a14:hiddenLine xmlns="" xmlns:a14="http://schemas.microsoft.com/office/drawing/2010/main" w="9525">
                 <a:solidFill>
                   <a:srgbClr val="000000"/>
                 </a:solidFill>
@@ -2852,7 +2852,7 @@
           <a:p>
             <a:fld id="{5C32D0B7-969E-4D1C-93A1-F873106F4B68}" type="datetime1">
               <a:rPr lang="en-US" smtClean="0"/>
-              <a:t>2/6/2018</a:t>
+              <a:t>2/12/2018</a:t>
             </a:fld>
             <a:endParaRPr lang="en-US" dirty="0"/>
           </a:p>
@@ -3191,7 +3191,7 @@
           <a:p>
             <a:fld id="{F588D111-512E-404A-A837-F888010A64EE}" type="datetime1">
               <a:rPr lang="en-US" smtClean="0"/>
-              <a:t>2/6/2018</a:t>
+              <a:t>2/12/2018</a:t>
             </a:fld>
             <a:endParaRPr lang="en-US" dirty="0"/>
           </a:p>
@@ -3342,7 +3342,7 @@
           <a:ln/>
           <a:extLst>
             <a:ext uri="{91240B29-F687-4f45-9708-019B960494DF}">
-              <a14:hiddenLine xmlns:a14="http://schemas.microsoft.com/office/drawing/2010/main" xmlns="" w="9525">
+              <a14:hiddenLine xmlns="" xmlns:a14="http://schemas.microsoft.com/office/drawing/2010/main" w="9525">
                 <a:solidFill>
                   <a:srgbClr val="000000"/>
                 </a:solidFill>
@@ -3526,7 +3526,7 @@
           <a:p>
             <a:fld id="{4E3740DE-807E-4BDF-94A5-1E07E43B2F70}" type="datetime1">
               <a:rPr lang="en-US" smtClean="0"/>
-              <a:t>2/6/2018</a:t>
+              <a:t>2/12/2018</a:t>
             </a:fld>
             <a:endParaRPr lang="en-US" dirty="0"/>
           </a:p>
@@ -3677,7 +3677,7 @@
           <a:ln/>
           <a:extLst>
             <a:ext uri="{91240B29-F687-4f45-9708-019B960494DF}">
-              <a14:hiddenLine xmlns:a14="http://schemas.microsoft.com/office/drawing/2010/main" xmlns="" w="9525">
+              <a14:hiddenLine xmlns="" xmlns:a14="http://schemas.microsoft.com/office/drawing/2010/main" w="9525">
                 <a:solidFill>
                   <a:srgbClr val="000000"/>
                 </a:solidFill>
@@ -3999,7 +3999,7 @@
           <a:p>
             <a:fld id="{AA36ACBC-493E-4BF9-B3A4-5722734670BD}" type="datetime1">
               <a:rPr lang="en-US" smtClean="0"/>
-              <a:t>2/6/2018</a:t>
+              <a:t>2/12/2018</a:t>
             </a:fld>
             <a:endParaRPr lang="en-US" dirty="0"/>
           </a:p>
@@ -4150,7 +4150,7 @@
           <a:ln/>
           <a:extLst>
             <a:ext uri="{91240B29-F687-4f45-9708-019B960494DF}">
-              <a14:hiddenLine xmlns:a14="http://schemas.microsoft.com/office/drawing/2010/main" xmlns="" w="9525">
+              <a14:hiddenLine xmlns="" xmlns:a14="http://schemas.microsoft.com/office/drawing/2010/main" w="9525">
                 <a:solidFill>
                   <a:srgbClr val="000000"/>
                 </a:solidFill>
@@ -4216,7 +4216,7 @@
           <a:p>
             <a:fld id="{9EFAF8A0-53BC-46ED-B0C4-C56F2E4F5AFB}" type="datetime1">
               <a:rPr lang="en-US" smtClean="0"/>
-              <a:t>2/6/2018</a:t>
+              <a:t>2/12/2018</a:t>
             </a:fld>
             <a:endParaRPr lang="en-US" dirty="0"/>
           </a:p>
@@ -4307,7 +4307,7 @@
           <a:p>
             <a:fld id="{FFBCF493-80D5-4007-BF3A-AD05581D7070}" type="datetime1">
               <a:rPr lang="en-US" smtClean="0"/>
-              <a:t>2/6/2018</a:t>
+              <a:t>2/12/2018</a:t>
             </a:fld>
             <a:endParaRPr lang="en-US" dirty="0"/>
           </a:p>
@@ -4571,7 +4571,7 @@
           <a:ln/>
           <a:extLst>
             <a:ext uri="{91240B29-F687-4f45-9708-019B960494DF}">
-              <a14:hiddenLine xmlns:a14="http://schemas.microsoft.com/office/drawing/2010/main" xmlns="" w="9525">
+              <a14:hiddenLine xmlns="" xmlns:a14="http://schemas.microsoft.com/office/drawing/2010/main" w="9525">
                 <a:solidFill>
                   <a:srgbClr val="000000"/>
                 </a:solidFill>
@@ -4770,7 +4770,7 @@
           <a:p>
             <a:fld id="{1A018D2C-1EFA-47A3-8F58-068A00DC442D}" type="datetime1">
               <a:rPr lang="en-US" smtClean="0"/>
-              <a:t>2/6/2018</a:t>
+              <a:t>2/12/2018</a:t>
             </a:fld>
             <a:endParaRPr lang="en-US" dirty="0"/>
           </a:p>
@@ -5079,7 +5079,7 @@
           <a:p>
             <a:fld id="{D11880D2-A2C3-4B9F-B414-77EED096AA8E}" type="datetime1">
               <a:rPr lang="en-US" smtClean="0"/>
-              <a:t>2/6/2018</a:t>
+              <a:t>2/12/2018</a:t>
             </a:fld>
             <a:endParaRPr lang="en-US" dirty="0"/>
           </a:p>
@@ -5345,7 +5345,7 @@
           <a:p>
             <a:fld id="{5E49406B-EF46-4E55-9D8B-D0577C078350}" type="datetime1">
               <a:rPr lang="en-US" smtClean="0"/>
-              <a:t>2/6/2018</a:t>
+              <a:t>2/12/2018</a:t>
             </a:fld>
             <a:endParaRPr lang="en-US" dirty="0"/>
           </a:p>
@@ -6179,7 +6179,7 @@
           <a:p>
             <a:r>
               <a:rPr lang="fr-FR" dirty="0"/>
-              <a:t>Structure du programme principale</a:t>
+              <a:t>Structure du programme principaux</a:t>
             </a:r>
           </a:p>
           <a:p>
@@ -7732,7 +7732,15 @@
             </a:r>
             <a:r>
               <a:rPr lang="en-US" b="1" dirty="0"/>
-              <a:t> utilizer (TCP UDP etc.)</a:t>
+              <a:t> </a:t>
+            </a:r>
+            <a:r>
+              <a:rPr lang="en-US" b="1" dirty="0" err="1"/>
+              <a:t>utiliser</a:t>
+            </a:r>
+            <a:r>
+              <a:rPr lang="en-US" b="1" dirty="0"/>
+              <a:t> (TCP UDP etc.)</a:t>
             </a:r>
           </a:p>
           <a:p>
@@ -7778,7 +7786,15 @@
             </a:r>
             <a:r>
               <a:rPr lang="en-US" b="1" dirty="0"/>
-              <a:t> de Net </a:t>
+              <a:t> de Net (</a:t>
+            </a:r>
+            <a:r>
+              <a:rPr lang="en-US" b="1" dirty="0" err="1"/>
+              <a:t>netif</a:t>
+            </a:r>
+            <a:r>
+              <a:rPr lang="en-US" b="1" dirty="0"/>
+              <a:t>)</a:t>
             </a:r>
           </a:p>
           <a:p>
@@ -7899,8 +7915,13 @@
           <a:p>
             <a:r>
               <a:rPr lang="fr-FR" b="1" dirty="0"/>
-              <a:t>Pour trouver les appareils</a:t>
-            </a:r>
+              <a:t>Pour </a:t>
+            </a:r>
+            <a:r>
+              <a:rPr lang="fr-FR" b="1"/>
+              <a:t>identifier l’appareil</a:t>
+            </a:r>
+            <a:endParaRPr lang="fr-FR" b="1" dirty="0"/>
           </a:p>
           <a:p>
             <a:r>

</xml_diff>